<commit_message>
maj formules + debut theorie single shot
</commit_message>
<xml_diff>
--- a/report/fig/schema1D.pptx
+++ b/report/fig/schema1D.pptx
@@ -243,7 +243,7 @@
           <a:p>
             <a:fld id="{88D20D04-CB76-480B-B12D-1440465E42CD}" type="datetimeFigureOut">
               <a:rPr lang="fr-FR" smtClean="0"/>
-              <a:t>29/11/2015</a:t>
+              <a:t>05/12/2015</a:t>
             </a:fld>
             <a:endParaRPr lang="fr-FR"/>
           </a:p>
@@ -413,7 +413,7 @@
           <a:p>
             <a:fld id="{88D20D04-CB76-480B-B12D-1440465E42CD}" type="datetimeFigureOut">
               <a:rPr lang="fr-FR" smtClean="0"/>
-              <a:t>29/11/2015</a:t>
+              <a:t>05/12/2015</a:t>
             </a:fld>
             <a:endParaRPr lang="fr-FR"/>
           </a:p>
@@ -593,7 +593,7 @@
           <a:p>
             <a:fld id="{88D20D04-CB76-480B-B12D-1440465E42CD}" type="datetimeFigureOut">
               <a:rPr lang="fr-FR" smtClean="0"/>
-              <a:t>29/11/2015</a:t>
+              <a:t>05/12/2015</a:t>
             </a:fld>
             <a:endParaRPr lang="fr-FR"/>
           </a:p>
@@ -763,7 +763,7 @@
           <a:p>
             <a:fld id="{88D20D04-CB76-480B-B12D-1440465E42CD}" type="datetimeFigureOut">
               <a:rPr lang="fr-FR" smtClean="0"/>
-              <a:t>29/11/2015</a:t>
+              <a:t>05/12/2015</a:t>
             </a:fld>
             <a:endParaRPr lang="fr-FR"/>
           </a:p>
@@ -1009,7 +1009,7 @@
           <a:p>
             <a:fld id="{88D20D04-CB76-480B-B12D-1440465E42CD}" type="datetimeFigureOut">
               <a:rPr lang="fr-FR" smtClean="0"/>
-              <a:t>29/11/2015</a:t>
+              <a:t>05/12/2015</a:t>
             </a:fld>
             <a:endParaRPr lang="fr-FR"/>
           </a:p>
@@ -1241,7 +1241,7 @@
           <a:p>
             <a:fld id="{88D20D04-CB76-480B-B12D-1440465E42CD}" type="datetimeFigureOut">
               <a:rPr lang="fr-FR" smtClean="0"/>
-              <a:t>29/11/2015</a:t>
+              <a:t>05/12/2015</a:t>
             </a:fld>
             <a:endParaRPr lang="fr-FR"/>
           </a:p>
@@ -1608,7 +1608,7 @@
           <a:p>
             <a:fld id="{88D20D04-CB76-480B-B12D-1440465E42CD}" type="datetimeFigureOut">
               <a:rPr lang="fr-FR" smtClean="0"/>
-              <a:t>29/11/2015</a:t>
+              <a:t>05/12/2015</a:t>
             </a:fld>
             <a:endParaRPr lang="fr-FR"/>
           </a:p>
@@ -1726,7 +1726,7 @@
           <a:p>
             <a:fld id="{88D20D04-CB76-480B-B12D-1440465E42CD}" type="datetimeFigureOut">
               <a:rPr lang="fr-FR" smtClean="0"/>
-              <a:t>29/11/2015</a:t>
+              <a:t>05/12/2015</a:t>
             </a:fld>
             <a:endParaRPr lang="fr-FR"/>
           </a:p>
@@ -1821,7 +1821,7 @@
           <a:p>
             <a:fld id="{88D20D04-CB76-480B-B12D-1440465E42CD}" type="datetimeFigureOut">
               <a:rPr lang="fr-FR" smtClean="0"/>
-              <a:t>29/11/2015</a:t>
+              <a:t>05/12/2015</a:t>
             </a:fld>
             <a:endParaRPr lang="fr-FR"/>
           </a:p>
@@ -2098,7 +2098,7 @@
           <a:p>
             <a:fld id="{88D20D04-CB76-480B-B12D-1440465E42CD}" type="datetimeFigureOut">
               <a:rPr lang="fr-FR" smtClean="0"/>
-              <a:t>29/11/2015</a:t>
+              <a:t>05/12/2015</a:t>
             </a:fld>
             <a:endParaRPr lang="fr-FR"/>
           </a:p>
@@ -2351,7 +2351,7 @@
           <a:p>
             <a:fld id="{88D20D04-CB76-480B-B12D-1440465E42CD}" type="datetimeFigureOut">
               <a:rPr lang="fr-FR" smtClean="0"/>
-              <a:t>29/11/2015</a:t>
+              <a:t>05/12/2015</a:t>
             </a:fld>
             <a:endParaRPr lang="fr-FR"/>
           </a:p>
@@ -2564,7 +2564,7 @@
           <a:p>
             <a:fld id="{88D20D04-CB76-480B-B12D-1440465E42CD}" type="datetimeFigureOut">
               <a:rPr lang="fr-FR" smtClean="0"/>
-              <a:t>29/11/2015</a:t>
+              <a:t>05/12/2015</a:t>
             </a:fld>
             <a:endParaRPr lang="fr-FR"/>
           </a:p>
@@ -2969,16 +2969,46 @@
           <a:chExt cx="0" cy="0"/>
         </a:xfrm>
       </p:grpSpPr>
-      <p:sp>
-        <p:nvSpPr>
-          <p:cNvPr id="4" name="Rectangle à coins arrondis 3"/>
+      <p:cxnSp>
+        <p:nvCxnSpPr>
+          <p:cNvPr id="8" name="Connecteur droit 7"/>
+          <p:cNvCxnSpPr/>
+          <p:nvPr/>
+        </p:nvCxnSpPr>
+        <p:spPr>
+          <a:xfrm>
+            <a:off x="72736" y="2000248"/>
+            <a:ext cx="11856028" cy="0"/>
+          </a:xfrm>
+          <a:prstGeom prst="line">
+            <a:avLst/>
+          </a:prstGeom>
+        </p:spPr>
+        <p:style>
+          <a:lnRef idx="2">
+            <a:schemeClr val="dk1"/>
+          </a:lnRef>
+          <a:fillRef idx="0">
+            <a:schemeClr val="dk1"/>
+          </a:fillRef>
+          <a:effectRef idx="1">
+            <a:schemeClr val="dk1"/>
+          </a:effectRef>
+          <a:fontRef idx="minor">
+            <a:schemeClr val="tx1"/>
+          </a:fontRef>
+        </p:style>
+      </p:cxnSp>
+      <p:sp>
+        <p:nvSpPr>
+          <p:cNvPr id="9" name="Rectangle à coins arrondis 8"/>
           <p:cNvSpPr/>
           <p:nvPr/>
         </p:nvSpPr>
         <p:spPr>
-          <a:xfrm>
-            <a:off x="353291" y="1537854"/>
-            <a:ext cx="1517073" cy="904009"/>
+          <a:xfrm rot="20581973">
+            <a:off x="1021273" y="4313004"/>
+            <a:ext cx="1340425" cy="332509"/>
           </a:xfrm>
           <a:prstGeom prst="roundRect">
             <a:avLst/>
@@ -3009,156 +3039,18 @@
           </a:p>
         </p:txBody>
       </p:sp>
-      <p:sp>
-        <p:nvSpPr>
-          <p:cNvPr id="5" name="Trapèze 4"/>
-          <p:cNvSpPr/>
-          <p:nvPr/>
-        </p:nvSpPr>
-        <p:spPr>
-          <a:xfrm rot="16200000">
-            <a:off x="1776843" y="1756063"/>
-            <a:ext cx="665019" cy="467591"/>
-          </a:xfrm>
-          <a:prstGeom prst="trapezoid">
-            <a:avLst/>
-          </a:prstGeom>
-        </p:spPr>
-        <p:style>
-          <a:lnRef idx="2">
-            <a:schemeClr val="accent1">
-              <a:shade val="50000"/>
-            </a:schemeClr>
-          </a:lnRef>
-          <a:fillRef idx="1">
-            <a:schemeClr val="accent1"/>
-          </a:fillRef>
-          <a:effectRef idx="0">
-            <a:schemeClr val="accent1"/>
-          </a:effectRef>
-          <a:fontRef idx="minor">
-            <a:schemeClr val="lt1"/>
-          </a:fontRef>
-        </p:style>
-        <p:txBody>
-          <a:bodyPr rtlCol="0" anchor="ctr"/>
-          <a:lstStyle/>
-          <a:p>
-            <a:pPr algn="ctr"/>
-            <a:endParaRPr lang="fr-FR"/>
-          </a:p>
-        </p:txBody>
-      </p:sp>
-      <p:sp>
-        <p:nvSpPr>
-          <p:cNvPr id="6" name="ZoneTexte 5"/>
-          <p:cNvSpPr txBox="1"/>
-          <p:nvPr/>
-        </p:nvSpPr>
-        <p:spPr>
-          <a:xfrm>
-            <a:off x="488373" y="1585706"/>
-            <a:ext cx="1381991" cy="461665"/>
-          </a:xfrm>
-          <a:prstGeom prst="rect">
-            <a:avLst/>
-          </a:prstGeom>
-          <a:noFill/>
-        </p:spPr>
-        <p:txBody>
-          <a:bodyPr wrap="square" rtlCol="0">
-            <a:spAutoFit/>
-          </a:bodyPr>
-          <a:lstStyle/>
-          <a:p>
-            <a:r>
-              <a:rPr lang="fr-FR" sz="2400" dirty="0" smtClean="0"/>
-              <a:t>CAMERA</a:t>
-            </a:r>
-            <a:endParaRPr lang="fr-FR" sz="2400" dirty="0"/>
-          </a:p>
-        </p:txBody>
-      </p:sp>
-      <p:cxnSp>
-        <p:nvCxnSpPr>
-          <p:cNvPr id="8" name="Connecteur droit 7"/>
-          <p:cNvCxnSpPr/>
-          <p:nvPr/>
-        </p:nvCxnSpPr>
-        <p:spPr>
-          <a:xfrm>
-            <a:off x="72736" y="2000248"/>
-            <a:ext cx="11856028" cy="0"/>
-          </a:xfrm>
-          <a:prstGeom prst="line">
-            <a:avLst/>
-          </a:prstGeom>
-        </p:spPr>
-        <p:style>
-          <a:lnRef idx="2">
-            <a:schemeClr val="dk1"/>
-          </a:lnRef>
-          <a:fillRef idx="0">
-            <a:schemeClr val="dk1"/>
-          </a:fillRef>
-          <a:effectRef idx="1">
-            <a:schemeClr val="dk1"/>
-          </a:effectRef>
-          <a:fontRef idx="minor">
-            <a:schemeClr val="tx1"/>
-          </a:fontRef>
-        </p:style>
-      </p:cxnSp>
-      <p:sp>
-        <p:nvSpPr>
-          <p:cNvPr id="9" name="Rectangle à coins arrondis 8"/>
-          <p:cNvSpPr/>
-          <p:nvPr/>
-        </p:nvSpPr>
-        <p:spPr>
-          <a:xfrm rot="20581973">
-            <a:off x="372634" y="4489976"/>
-            <a:ext cx="1340425" cy="332509"/>
-          </a:xfrm>
-          <a:prstGeom prst="roundRect">
-            <a:avLst/>
-          </a:prstGeom>
-        </p:spPr>
-        <p:style>
-          <a:lnRef idx="2">
-            <a:schemeClr val="accent1">
-              <a:shade val="50000"/>
-            </a:schemeClr>
-          </a:lnRef>
-          <a:fillRef idx="1">
-            <a:schemeClr val="accent1"/>
-          </a:fillRef>
-          <a:effectRef idx="0">
-            <a:schemeClr val="accent1"/>
-          </a:effectRef>
-          <a:fontRef idx="minor">
-            <a:schemeClr val="lt1"/>
-          </a:fontRef>
-        </p:style>
-        <p:txBody>
-          <a:bodyPr rtlCol="0" anchor="ctr"/>
-          <a:lstStyle/>
-          <a:p>
-            <a:pPr algn="ctr"/>
-            <a:endParaRPr lang="fr-FR"/>
-          </a:p>
-        </p:txBody>
-      </p:sp>
       <p:cxnSp>
         <p:nvCxnSpPr>
           <p:cNvPr id="11" name="Connecteur droit 10"/>
-          <p:cNvCxnSpPr/>
+          <p:cNvCxnSpPr>
+            <a:stCxn id="9" idx="1"/>
+          </p:cNvCxnSpPr>
           <p:nvPr/>
         </p:nvCxnSpPr>
         <p:spPr>
           <a:xfrm flipV="1">
-            <a:off x="238991" y="1350818"/>
-            <a:ext cx="11617036" cy="3535403"/>
+            <a:off x="1050446" y="1350819"/>
+            <a:ext cx="10805581" cy="3324023"/>
           </a:xfrm>
           <a:prstGeom prst="line">
             <a:avLst/>
@@ -3497,8 +3389,9 @@
           <a:p>
             <a:r>
               <a:rPr lang="fr-FR" sz="2400" dirty="0"/>
-              <a:t>d</a:t>
-            </a:r>
+              <a:t>z</a:t>
+            </a:r>
+            <a:endParaRPr lang="fr-FR" sz="2400" dirty="0"/>
           </a:p>
         </p:txBody>
       </p:sp>
@@ -3602,9 +3495,7 @@
       <p:cxnSp>
         <p:nvCxnSpPr>
           <p:cNvPr id="37" name="Connecteur droit 36"/>
-          <p:cNvCxnSpPr>
-            <a:endCxn id="5" idx="2"/>
-          </p:cNvCxnSpPr>
+          <p:cNvCxnSpPr/>
           <p:nvPr/>
         </p:nvCxnSpPr>
         <p:spPr>
@@ -3694,6 +3585,393 @@
               <a:t>LIGHTING POINT</a:t>
             </a:r>
             <a:endParaRPr lang="fr-FR" sz="2400" dirty="0"/>
+          </a:p>
+        </p:txBody>
+      </p:sp>
+      <p:cxnSp>
+        <p:nvCxnSpPr>
+          <p:cNvPr id="3" name="Connecteur droit avec flèche 2"/>
+          <p:cNvCxnSpPr/>
+          <p:nvPr/>
+        </p:nvCxnSpPr>
+        <p:spPr>
+          <a:xfrm>
+            <a:off x="2343148" y="1568207"/>
+            <a:ext cx="0" cy="941557"/>
+          </a:xfrm>
+          <a:prstGeom prst="straightConnector1">
+            <a:avLst/>
+          </a:prstGeom>
+          <a:ln>
+            <a:headEnd type="triangle"/>
+            <a:tailEnd type="triangle"/>
+          </a:ln>
+        </p:spPr>
+        <p:style>
+          <a:lnRef idx="3">
+            <a:schemeClr val="accent1"/>
+          </a:lnRef>
+          <a:fillRef idx="0">
+            <a:schemeClr val="accent1"/>
+          </a:fillRef>
+          <a:effectRef idx="2">
+            <a:schemeClr val="accent1"/>
+          </a:effectRef>
+          <a:fontRef idx="minor">
+            <a:schemeClr val="tx1"/>
+          </a:fontRef>
+        </p:style>
+      </p:cxnSp>
+      <p:sp>
+        <p:nvSpPr>
+          <p:cNvPr id="7" name="ZoneTexte 6"/>
+          <p:cNvSpPr txBox="1"/>
+          <p:nvPr/>
+        </p:nvSpPr>
+        <p:spPr>
+          <a:xfrm>
+            <a:off x="1917123" y="2490699"/>
+            <a:ext cx="945573" cy="461665"/>
+          </a:xfrm>
+          <a:prstGeom prst="rect">
+            <a:avLst/>
+          </a:prstGeom>
+          <a:noFill/>
+        </p:spPr>
+        <p:txBody>
+          <a:bodyPr wrap="square" rtlCol="0">
+            <a:spAutoFit/>
+          </a:bodyPr>
+          <a:lstStyle/>
+          <a:p>
+            <a:r>
+              <a:rPr lang="fr-FR" sz="2400" dirty="0" smtClean="0"/>
+              <a:t>LENS</a:t>
+            </a:r>
+            <a:endParaRPr lang="fr-FR" sz="2400" dirty="0"/>
+          </a:p>
+        </p:txBody>
+      </p:sp>
+      <p:cxnSp>
+        <p:nvCxnSpPr>
+          <p:cNvPr id="15" name="Connecteur droit 14"/>
+          <p:cNvCxnSpPr/>
+          <p:nvPr/>
+        </p:nvCxnSpPr>
+        <p:spPr>
+          <a:xfrm>
+            <a:off x="1548245" y="1401951"/>
+            <a:ext cx="0" cy="1113153"/>
+          </a:xfrm>
+          <a:prstGeom prst="line">
+            <a:avLst/>
+          </a:prstGeom>
+        </p:spPr>
+        <p:style>
+          <a:lnRef idx="3">
+            <a:schemeClr val="accent1"/>
+          </a:lnRef>
+          <a:fillRef idx="0">
+            <a:schemeClr val="accent1"/>
+          </a:fillRef>
+          <a:effectRef idx="2">
+            <a:schemeClr val="accent1"/>
+          </a:effectRef>
+          <a:fontRef idx="minor">
+            <a:schemeClr val="tx1"/>
+          </a:fontRef>
+        </p:style>
+      </p:cxnSp>
+      <p:sp>
+        <p:nvSpPr>
+          <p:cNvPr id="29" name="ZoneTexte 28"/>
+          <p:cNvSpPr txBox="1"/>
+          <p:nvPr/>
+        </p:nvSpPr>
+        <p:spPr>
+          <a:xfrm>
+            <a:off x="1168534" y="2505892"/>
+            <a:ext cx="704466" cy="463723"/>
+          </a:xfrm>
+          <a:prstGeom prst="rect">
+            <a:avLst/>
+          </a:prstGeom>
+          <a:noFill/>
+        </p:spPr>
+        <p:txBody>
+          <a:bodyPr wrap="square" rtlCol="0">
+            <a:spAutoFit/>
+          </a:bodyPr>
+          <a:lstStyle/>
+          <a:p>
+            <a:r>
+              <a:rPr lang="fr-FR" sz="2400" dirty="0" smtClean="0"/>
+              <a:t>CCD</a:t>
+            </a:r>
+            <a:endParaRPr lang="fr-FR" sz="2400" dirty="0"/>
+          </a:p>
+        </p:txBody>
+      </p:sp>
+      <p:cxnSp>
+        <p:nvCxnSpPr>
+          <p:cNvPr id="19" name="Connecteur droit 18"/>
+          <p:cNvCxnSpPr/>
+          <p:nvPr/>
+        </p:nvCxnSpPr>
+        <p:spPr>
+          <a:xfrm flipH="1" flipV="1">
+            <a:off x="1548245" y="1714500"/>
+            <a:ext cx="4094018" cy="1527464"/>
+          </a:xfrm>
+          <a:prstGeom prst="line">
+            <a:avLst/>
+          </a:prstGeom>
+          <a:ln>
+            <a:solidFill>
+              <a:srgbClr val="00F43A"/>
+            </a:solidFill>
+          </a:ln>
+        </p:spPr>
+        <p:style>
+          <a:lnRef idx="1">
+            <a:schemeClr val="accent6"/>
+          </a:lnRef>
+          <a:fillRef idx="0">
+            <a:schemeClr val="accent6"/>
+          </a:fillRef>
+          <a:effectRef idx="0">
+            <a:schemeClr val="accent6"/>
+          </a:effectRef>
+          <a:fontRef idx="minor">
+            <a:schemeClr val="tx1"/>
+          </a:fontRef>
+        </p:style>
+      </p:cxnSp>
+      <p:cxnSp>
+        <p:nvCxnSpPr>
+          <p:cNvPr id="24" name="Connecteur droit avec flèche 23"/>
+          <p:cNvCxnSpPr/>
+          <p:nvPr/>
+        </p:nvCxnSpPr>
+        <p:spPr>
+          <a:xfrm>
+            <a:off x="1423555" y="1714500"/>
+            <a:ext cx="0" cy="285748"/>
+          </a:xfrm>
+          <a:prstGeom prst="straightConnector1">
+            <a:avLst/>
+          </a:prstGeom>
+          <a:ln>
+            <a:headEnd type="triangle"/>
+            <a:tailEnd type="triangle"/>
+          </a:ln>
+        </p:spPr>
+        <p:style>
+          <a:lnRef idx="1">
+            <a:schemeClr val="dk1"/>
+          </a:lnRef>
+          <a:fillRef idx="0">
+            <a:schemeClr val="dk1"/>
+          </a:fillRef>
+          <a:effectRef idx="0">
+            <a:schemeClr val="dk1"/>
+          </a:effectRef>
+          <a:fontRef idx="minor">
+            <a:schemeClr val="tx1"/>
+          </a:fontRef>
+        </p:style>
+      </p:cxnSp>
+      <p:sp>
+        <p:nvSpPr>
+          <p:cNvPr id="25" name="ZoneTexte 24"/>
+          <p:cNvSpPr txBox="1"/>
+          <p:nvPr/>
+        </p:nvSpPr>
+        <p:spPr>
+          <a:xfrm>
+            <a:off x="1076021" y="1589777"/>
+            <a:ext cx="380709" cy="461665"/>
+          </a:xfrm>
+          <a:prstGeom prst="rect">
+            <a:avLst/>
+          </a:prstGeom>
+          <a:noFill/>
+        </p:spPr>
+        <p:txBody>
+          <a:bodyPr wrap="square" rtlCol="0">
+            <a:spAutoFit/>
+          </a:bodyPr>
+          <a:lstStyle/>
+          <a:p>
+            <a:r>
+              <a:rPr lang="fr-FR" sz="2400" dirty="0" smtClean="0"/>
+              <a:t>p</a:t>
+            </a:r>
+            <a:endParaRPr lang="fr-FR" sz="2400" dirty="0"/>
+          </a:p>
+        </p:txBody>
+      </p:sp>
+      <p:cxnSp>
+        <p:nvCxnSpPr>
+          <p:cNvPr id="32" name="Connecteur droit avec flèche 31"/>
+          <p:cNvCxnSpPr/>
+          <p:nvPr/>
+        </p:nvCxnSpPr>
+        <p:spPr>
+          <a:xfrm>
+            <a:off x="1548245" y="1568207"/>
+            <a:ext cx="794903" cy="0"/>
+          </a:xfrm>
+          <a:prstGeom prst="straightConnector1">
+            <a:avLst/>
+          </a:prstGeom>
+          <a:ln>
+            <a:headEnd type="triangle"/>
+            <a:tailEnd type="triangle"/>
+          </a:ln>
+        </p:spPr>
+        <p:style>
+          <a:lnRef idx="1">
+            <a:schemeClr val="dk1"/>
+          </a:lnRef>
+          <a:fillRef idx="0">
+            <a:schemeClr val="dk1"/>
+          </a:fillRef>
+          <a:effectRef idx="0">
+            <a:schemeClr val="dk1"/>
+          </a:effectRef>
+          <a:fontRef idx="minor">
+            <a:schemeClr val="tx1"/>
+          </a:fontRef>
+        </p:style>
+      </p:cxnSp>
+      <p:sp>
+        <p:nvSpPr>
+          <p:cNvPr id="34" name="ZoneTexte 33"/>
+          <p:cNvSpPr txBox="1"/>
+          <p:nvPr/>
+        </p:nvSpPr>
+        <p:spPr>
+          <a:xfrm>
+            <a:off x="1735281" y="1140876"/>
+            <a:ext cx="470469" cy="461665"/>
+          </a:xfrm>
+          <a:prstGeom prst="rect">
+            <a:avLst/>
+          </a:prstGeom>
+          <a:noFill/>
+        </p:spPr>
+        <p:txBody>
+          <a:bodyPr wrap="square" rtlCol="0">
+            <a:spAutoFit/>
+          </a:bodyPr>
+          <a:lstStyle/>
+          <a:p>
+            <a:r>
+              <a:rPr lang="fr-FR" sz="2400" dirty="0" smtClean="0"/>
+              <a:t>f</a:t>
+            </a:r>
+            <a:r>
+              <a:rPr lang="fr-FR" sz="2400" baseline="-25000" dirty="0" smtClean="0"/>
+              <a:t>0</a:t>
+            </a:r>
+            <a:endParaRPr lang="fr-FR" sz="2400" baseline="-25000" dirty="0"/>
+          </a:p>
+        </p:txBody>
+      </p:sp>
+      <p:cxnSp>
+        <p:nvCxnSpPr>
+          <p:cNvPr id="41" name="Connecteur droit avec flèche 40"/>
+          <p:cNvCxnSpPr/>
+          <p:nvPr/>
+        </p:nvCxnSpPr>
+        <p:spPr>
+          <a:xfrm>
+            <a:off x="1861411" y="2000248"/>
+            <a:ext cx="0" cy="2311771"/>
+          </a:xfrm>
+          <a:prstGeom prst="straightConnector1">
+            <a:avLst/>
+          </a:prstGeom>
+          <a:ln>
+            <a:headEnd type="triangle"/>
+            <a:tailEnd type="triangle"/>
+          </a:ln>
+        </p:spPr>
+        <p:style>
+          <a:lnRef idx="1">
+            <a:schemeClr val="dk1"/>
+          </a:lnRef>
+          <a:fillRef idx="0">
+            <a:schemeClr val="dk1"/>
+          </a:fillRef>
+          <a:effectRef idx="0">
+            <a:schemeClr val="dk1"/>
+          </a:effectRef>
+          <a:fontRef idx="minor">
+            <a:schemeClr val="tx1"/>
+          </a:fontRef>
+        </p:style>
+      </p:cxnSp>
+      <p:cxnSp>
+        <p:nvCxnSpPr>
+          <p:cNvPr id="44" name="Connecteur droit 43"/>
+          <p:cNvCxnSpPr/>
+          <p:nvPr/>
+        </p:nvCxnSpPr>
+        <p:spPr>
+          <a:xfrm flipH="1">
+            <a:off x="1246908" y="4283676"/>
+            <a:ext cx="1407734" cy="0"/>
+          </a:xfrm>
+          <a:prstGeom prst="line">
+            <a:avLst/>
+          </a:prstGeom>
+          <a:ln>
+            <a:prstDash val="dash"/>
+          </a:ln>
+        </p:spPr>
+        <p:style>
+          <a:lnRef idx="1">
+            <a:schemeClr val="dk1"/>
+          </a:lnRef>
+          <a:fillRef idx="0">
+            <a:schemeClr val="dk1"/>
+          </a:fillRef>
+          <a:effectRef idx="0">
+            <a:schemeClr val="dk1"/>
+          </a:effectRef>
+          <a:fontRef idx="minor">
+            <a:schemeClr val="tx1"/>
+          </a:fontRef>
+        </p:style>
+      </p:cxnSp>
+      <p:sp>
+        <p:nvSpPr>
+          <p:cNvPr id="45" name="ZoneTexte 44"/>
+          <p:cNvSpPr txBox="1"/>
+          <p:nvPr/>
+        </p:nvSpPr>
+        <p:spPr>
+          <a:xfrm>
+            <a:off x="1548244" y="3193471"/>
+            <a:ext cx="358487" cy="461665"/>
+          </a:xfrm>
+          <a:prstGeom prst="rect">
+            <a:avLst/>
+          </a:prstGeom>
+          <a:noFill/>
+        </p:spPr>
+        <p:txBody>
+          <a:bodyPr wrap="square" rtlCol="0">
+            <a:spAutoFit/>
+          </a:bodyPr>
+          <a:lstStyle/>
+          <a:p>
+            <a:r>
+              <a:rPr lang="fr-FR" sz="2400" dirty="0"/>
+              <a:t>d</a:t>
+            </a:r>
           </a:p>
         </p:txBody>
       </p:sp>

</xml_diff>